<commit_message>
feat: add support for placeholder pictures
</commit_message>
<xml_diff>
--- a/doc/test/SyncLab/SyncLab_VisualEffects.pptx
+++ b/doc/test/SyncLab/SyncLab_VisualEffects.pptx
@@ -8,7 +8,7 @@
     <p:sldMasterId id="2147483684" r:id="rId4"/>
   </p:sldMasterIdLst>
   <p:notesMasterIdLst>
-    <p:notesMasterId r:id="rId11"/>
+    <p:notesMasterId r:id="rId12"/>
   </p:notesMasterIdLst>
   <p:sldIdLst>
     <p:sldId id="287" r:id="rId5"/>
@@ -16,7 +16,8 @@
     <p:sldId id="311" r:id="rId7"/>
     <p:sldId id="294" r:id="rId8"/>
     <p:sldId id="312" r:id="rId9"/>
-    <p:sldId id="313" r:id="rId10"/>
+    <p:sldId id="314" r:id="rId10"/>
+    <p:sldId id="313" r:id="rId11"/>
   </p:sldIdLst>
   <p:sldSz cx="9144000" cy="6858000" type="screen4x3"/>
   <p:notesSz cx="6858000" cy="9144000"/>
@@ -129,6 +130,7 @@
             <p14:sldId id="311"/>
             <p14:sldId id="294"/>
             <p14:sldId id="312"/>
+            <p14:sldId id="314"/>
             <p14:sldId id="313"/>
           </p14:sldIdLst>
         </p14:section>
@@ -227,7 +229,7 @@
           <a:p>
             <a:fld id="{43E32005-3A63-48D2-8C73-BF5F95786EBD}" type="datetimeFigureOut">
               <a:rPr lang="en-US" smtClean="0"/>
-              <a:t>2/7/2018</a:t>
+              <a:t>2/17/2018</a:t>
             </a:fld>
             <a:endParaRPr lang="en-US"/>
           </a:p>
@@ -745,6 +747,93 @@
     </p:spTree>
     <p:extLst>
       <p:ext uri="{BB962C8B-B14F-4D97-AF65-F5344CB8AC3E}">
+        <p14:creationId xmlns:p14="http://schemas.microsoft.com/office/powerpoint/2010/main" val="3579204259"/>
+      </p:ext>
+    </p:extLst>
+  </p:cSld>
+  <p:clrMapOvr>
+    <a:masterClrMapping/>
+  </p:clrMapOvr>
+</p:notes>
+</file>
+
+<file path=ppt/notesSlides/notesSlide4.xml><?xml version="1.0" encoding="utf-8"?>
+<p:notes xmlns:a="http://schemas.openxmlformats.org/drawingml/2006/main" xmlns:r="http://schemas.openxmlformats.org/officeDocument/2006/relationships" xmlns:p="http://schemas.openxmlformats.org/presentationml/2006/main">
+  <p:cSld>
+    <p:spTree>
+      <p:nvGrpSpPr>
+        <p:cNvPr id="1" name=""/>
+        <p:cNvGrpSpPr/>
+        <p:nvPr/>
+      </p:nvGrpSpPr>
+      <p:grpSpPr>
+        <a:xfrm>
+          <a:off x="0" y="0"/>
+          <a:ext cx="0" cy="0"/>
+          <a:chOff x="0" y="0"/>
+          <a:chExt cx="0" cy="0"/>
+        </a:xfrm>
+      </p:grpSpPr>
+      <p:sp>
+        <p:nvSpPr>
+          <p:cNvPr id="2" name="Slide Image Placeholder 1"/>
+          <p:cNvSpPr>
+            <a:spLocks noGrp="1" noRot="1" noChangeAspect="1"/>
+          </p:cNvSpPr>
+          <p:nvPr>
+            <p:ph type="sldImg"/>
+          </p:nvPr>
+        </p:nvSpPr>
+        <p:spPr/>
+      </p:sp>
+      <p:sp>
+        <p:nvSpPr>
+          <p:cNvPr id="3" name="Notes Placeholder 2"/>
+          <p:cNvSpPr>
+            <a:spLocks noGrp="1"/>
+          </p:cNvSpPr>
+          <p:nvPr>
+            <p:ph type="body" idx="1"/>
+          </p:nvPr>
+        </p:nvSpPr>
+        <p:spPr/>
+        <p:txBody>
+          <a:bodyPr/>
+          <a:lstStyle/>
+          <a:p>
+            <a:r>
+              <a:rPr lang="en-US" dirty="0"/>
+              <a:t>Original Shapes</a:t>
+            </a:r>
+          </a:p>
+        </p:txBody>
+      </p:sp>
+      <p:sp>
+        <p:nvSpPr>
+          <p:cNvPr id="4" name="Slide Number Placeholder 3"/>
+          <p:cNvSpPr>
+            <a:spLocks noGrp="1"/>
+          </p:cNvSpPr>
+          <p:nvPr>
+            <p:ph type="sldNum" sz="quarter" idx="10"/>
+          </p:nvPr>
+        </p:nvSpPr>
+        <p:spPr/>
+        <p:txBody>
+          <a:bodyPr/>
+          <a:lstStyle/>
+          <a:p>
+            <a:fld id="{0FE7C38A-472B-4221-8E00-509E1DA863EC}" type="slidenum">
+              <a:rPr lang="en-US" smtClean="0"/>
+              <a:t>7</a:t>
+            </a:fld>
+            <a:endParaRPr lang="en-US"/>
+          </a:p>
+        </p:txBody>
+      </p:sp>
+    </p:spTree>
+    <p:extLst>
+      <p:ext uri="{BB962C8B-B14F-4D97-AF65-F5344CB8AC3E}">
         <p14:creationId xmlns:p14="http://schemas.microsoft.com/office/powerpoint/2010/main" val="4213226620"/>
       </p:ext>
     </p:extLst>
@@ -934,7 +1023,7 @@
           <a:p>
             <a:fld id="{699DC775-C286-4358-8C92-D7E584E969B3}" type="datetimeFigureOut">
               <a:rPr lang="en-US" smtClean="0"/>
-              <a:t>2/7/2018</a:t>
+              <a:t>2/17/2018</a:t>
             </a:fld>
             <a:endParaRPr lang="en-US"/>
           </a:p>
@@ -1102,7 +1191,7 @@
           <a:p>
             <a:fld id="{699DC775-C286-4358-8C92-D7E584E969B3}" type="datetimeFigureOut">
               <a:rPr lang="en-US" smtClean="0"/>
-              <a:t>2/7/2018</a:t>
+              <a:t>2/17/2018</a:t>
             </a:fld>
             <a:endParaRPr lang="en-US"/>
           </a:p>
@@ -1280,7 +1369,7 @@
           <a:p>
             <a:fld id="{699DC775-C286-4358-8C92-D7E584E969B3}" type="datetimeFigureOut">
               <a:rPr lang="en-US" smtClean="0"/>
-              <a:t>2/7/2018</a:t>
+              <a:t>2/17/2018</a:t>
             </a:fld>
             <a:endParaRPr lang="en-US"/>
           </a:p>
@@ -1520,7 +1609,7 @@
           <a:p>
             <a:fld id="{699DC775-C286-4358-8C92-D7E584E969B3}" type="datetimeFigureOut">
               <a:rPr lang="en-US" smtClean="0"/>
-              <a:t>2/7/2018</a:t>
+              <a:t>2/17/2018</a:t>
             </a:fld>
             <a:endParaRPr lang="en-US"/>
           </a:p>
@@ -1688,7 +1777,7 @@
           <a:p>
             <a:fld id="{699DC775-C286-4358-8C92-D7E584E969B3}" type="datetimeFigureOut">
               <a:rPr lang="en-US" smtClean="0"/>
-              <a:t>2/7/2018</a:t>
+              <a:t>2/17/2018</a:t>
             </a:fld>
             <a:endParaRPr lang="en-US"/>
           </a:p>
@@ -1933,7 +2022,7 @@
           <a:p>
             <a:fld id="{699DC775-C286-4358-8C92-D7E584E969B3}" type="datetimeFigureOut">
               <a:rPr lang="en-US" smtClean="0"/>
-              <a:t>2/7/2018</a:t>
+              <a:t>2/17/2018</a:t>
             </a:fld>
             <a:endParaRPr lang="en-US"/>
           </a:p>
@@ -2218,7 +2307,7 @@
           <a:p>
             <a:fld id="{699DC775-C286-4358-8C92-D7E584E969B3}" type="datetimeFigureOut">
               <a:rPr lang="en-US" smtClean="0"/>
-              <a:t>2/7/2018</a:t>
+              <a:t>2/17/2018</a:t>
             </a:fld>
             <a:endParaRPr lang="en-US"/>
           </a:p>
@@ -2637,7 +2726,7 @@
           <a:p>
             <a:fld id="{699DC775-C286-4358-8C92-D7E584E969B3}" type="datetimeFigureOut">
               <a:rPr lang="en-US" smtClean="0"/>
-              <a:t>2/7/2018</a:t>
+              <a:t>2/17/2018</a:t>
             </a:fld>
             <a:endParaRPr lang="en-US"/>
           </a:p>
@@ -2754,7 +2843,7 @@
           <a:p>
             <a:fld id="{699DC775-C286-4358-8C92-D7E584E969B3}" type="datetimeFigureOut">
               <a:rPr lang="en-US" smtClean="0"/>
-              <a:t>2/7/2018</a:t>
+              <a:t>2/17/2018</a:t>
             </a:fld>
             <a:endParaRPr lang="en-US"/>
           </a:p>
@@ -2849,7 +2938,7 @@
           <a:p>
             <a:fld id="{699DC775-C286-4358-8C92-D7E584E969B3}" type="datetimeFigureOut">
               <a:rPr lang="en-US" smtClean="0"/>
-              <a:t>2/7/2018</a:t>
+              <a:t>2/17/2018</a:t>
             </a:fld>
             <a:endParaRPr lang="en-US"/>
           </a:p>
@@ -3124,7 +3213,7 @@
           <a:p>
             <a:fld id="{699DC775-C286-4358-8C92-D7E584E969B3}" type="datetimeFigureOut">
               <a:rPr lang="en-US" smtClean="0"/>
-              <a:t>2/7/2018</a:t>
+              <a:t>2/17/2018</a:t>
             </a:fld>
             <a:endParaRPr lang="en-US"/>
           </a:p>
@@ -3292,7 +3381,7 @@
           <a:p>
             <a:fld id="{699DC775-C286-4358-8C92-D7E584E969B3}" type="datetimeFigureOut">
               <a:rPr lang="en-US" smtClean="0"/>
-              <a:t>2/7/2018</a:t>
+              <a:t>2/17/2018</a:t>
             </a:fld>
             <a:endParaRPr lang="en-US"/>
           </a:p>
@@ -3544,7 +3633,7 @@
           <a:p>
             <a:fld id="{699DC775-C286-4358-8C92-D7E584E969B3}" type="datetimeFigureOut">
               <a:rPr lang="en-US" smtClean="0"/>
-              <a:t>2/7/2018</a:t>
+              <a:t>2/17/2018</a:t>
             </a:fld>
             <a:endParaRPr lang="en-US"/>
           </a:p>
@@ -3712,7 +3801,7 @@
           <a:p>
             <a:fld id="{699DC775-C286-4358-8C92-D7E584E969B3}" type="datetimeFigureOut">
               <a:rPr lang="en-US" smtClean="0"/>
-              <a:t>2/7/2018</a:t>
+              <a:t>2/17/2018</a:t>
             </a:fld>
             <a:endParaRPr lang="en-US"/>
           </a:p>
@@ -3890,7 +3979,7 @@
           <a:p>
             <a:fld id="{699DC775-C286-4358-8C92-D7E584E969B3}" type="datetimeFigureOut">
               <a:rPr lang="en-US" smtClean="0"/>
-              <a:t>2/7/2018</a:t>
+              <a:t>2/17/2018</a:t>
             </a:fld>
             <a:endParaRPr lang="en-US"/>
           </a:p>
@@ -4138,7 +4227,7 @@
           <a:p>
             <a:fld id="{699DC775-C286-4358-8C92-D7E584E969B3}" type="datetimeFigureOut">
               <a:rPr lang="en-US" smtClean="0"/>
-              <a:t>2/7/2018</a:t>
+              <a:t>2/17/2018</a:t>
             </a:fld>
             <a:endParaRPr lang="en-US"/>
           </a:p>
@@ -4314,7 +4403,7 @@
           <a:p>
             <a:fld id="{699DC775-C286-4358-8C92-D7E584E969B3}" type="datetimeFigureOut">
               <a:rPr lang="en-US" smtClean="0"/>
-              <a:t>2/7/2018</a:t>
+              <a:t>2/17/2018</a:t>
             </a:fld>
             <a:endParaRPr lang="en-US"/>
           </a:p>
@@ -4567,7 +4656,7 @@
           <a:p>
             <a:fld id="{699DC775-C286-4358-8C92-D7E584E969B3}" type="datetimeFigureOut">
               <a:rPr lang="en-US" smtClean="0"/>
-              <a:t>2/7/2018</a:t>
+              <a:t>2/17/2018</a:t>
             </a:fld>
             <a:endParaRPr lang="en-US"/>
           </a:p>
@@ -4860,7 +4949,7 @@
           <a:p>
             <a:fld id="{699DC775-C286-4358-8C92-D7E584E969B3}" type="datetimeFigureOut">
               <a:rPr lang="en-US" smtClean="0"/>
-              <a:t>2/7/2018</a:t>
+              <a:t>2/17/2018</a:t>
             </a:fld>
             <a:endParaRPr lang="en-US"/>
           </a:p>
@@ -5287,7 +5376,7 @@
           <a:p>
             <a:fld id="{699DC775-C286-4358-8C92-D7E584E969B3}" type="datetimeFigureOut">
               <a:rPr lang="en-US" smtClean="0"/>
-              <a:t>2/7/2018</a:t>
+              <a:t>2/17/2018</a:t>
             </a:fld>
             <a:endParaRPr lang="en-US"/>
           </a:p>
@@ -5412,7 +5501,7 @@
           <a:p>
             <a:fld id="{699DC775-C286-4358-8C92-D7E584E969B3}" type="datetimeFigureOut">
               <a:rPr lang="en-US" smtClean="0"/>
-              <a:t>2/7/2018</a:t>
+              <a:t>2/17/2018</a:t>
             </a:fld>
             <a:endParaRPr lang="en-US"/>
           </a:p>
@@ -5515,7 +5604,7 @@
           <a:p>
             <a:fld id="{699DC775-C286-4358-8C92-D7E584E969B3}" type="datetimeFigureOut">
               <a:rPr lang="en-US" smtClean="0"/>
-              <a:t>2/7/2018</a:t>
+              <a:t>2/17/2018</a:t>
             </a:fld>
             <a:endParaRPr lang="en-US"/>
           </a:p>
@@ -5760,7 +5849,7 @@
           <a:p>
             <a:fld id="{699DC775-C286-4358-8C92-D7E584E969B3}" type="datetimeFigureOut">
               <a:rPr lang="en-US" smtClean="0"/>
-              <a:t>2/7/2018</a:t>
+              <a:t>2/17/2018</a:t>
             </a:fld>
             <a:endParaRPr lang="en-US"/>
           </a:p>
@@ -6043,7 +6132,7 @@
           <a:p>
             <a:fld id="{699DC775-C286-4358-8C92-D7E584E969B3}" type="datetimeFigureOut">
               <a:rPr lang="en-US" smtClean="0"/>
-              <a:t>2/7/2018</a:t>
+              <a:t>2/17/2018</a:t>
             </a:fld>
             <a:endParaRPr lang="en-US"/>
           </a:p>
@@ -6303,7 +6392,7 @@
           <a:p>
             <a:fld id="{699DC775-C286-4358-8C92-D7E584E969B3}" type="datetimeFigureOut">
               <a:rPr lang="en-US" smtClean="0"/>
-              <a:t>2/7/2018</a:t>
+              <a:t>2/17/2018</a:t>
             </a:fld>
             <a:endParaRPr lang="en-US"/>
           </a:p>
@@ -6479,7 +6568,7 @@
           <a:p>
             <a:fld id="{699DC775-C286-4358-8C92-D7E584E969B3}" type="datetimeFigureOut">
               <a:rPr lang="en-US" smtClean="0"/>
-              <a:t>2/7/2018</a:t>
+              <a:t>2/17/2018</a:t>
             </a:fld>
             <a:endParaRPr lang="en-US"/>
           </a:p>
@@ -6665,7 +6754,7 @@
           <a:p>
             <a:fld id="{699DC775-C286-4358-8C92-D7E584E969B3}" type="datetimeFigureOut">
               <a:rPr lang="en-US" smtClean="0"/>
-              <a:t>2/7/2018</a:t>
+              <a:t>2/17/2018</a:t>
             </a:fld>
             <a:endParaRPr lang="en-US"/>
           </a:p>
@@ -6855,7 +6944,7 @@
           <a:p>
             <a:fld id="{45696B32-6A70-48EC-8939-9D142D9557CD}" type="datetimeFigureOut">
               <a:rPr lang="en-US" smtClean="0"/>
-              <a:t>2/7/2018</a:t>
+              <a:t>2/17/2018</a:t>
             </a:fld>
             <a:endParaRPr lang="en-US"/>
           </a:p>
@@ -7169,7 +7258,7 @@
           <a:p>
             <a:fld id="{45696B32-6A70-48EC-8939-9D142D9557CD}" type="datetimeFigureOut">
               <a:rPr lang="en-US" smtClean="0"/>
-              <a:t>2/7/2018</a:t>
+              <a:t>2/17/2018</a:t>
             </a:fld>
             <a:endParaRPr lang="en-US"/>
           </a:p>
@@ -7414,7 +7503,7 @@
           <a:p>
             <a:fld id="{45696B32-6A70-48EC-8939-9D142D9557CD}" type="datetimeFigureOut">
               <a:rPr lang="en-US" smtClean="0"/>
-              <a:t>2/7/2018</a:t>
+              <a:t>2/17/2018</a:t>
             </a:fld>
             <a:endParaRPr lang="en-US"/>
           </a:p>
@@ -7643,7 +7732,7 @@
           <a:p>
             <a:fld id="{45696B32-6A70-48EC-8939-9D142D9557CD}" type="datetimeFigureOut">
               <a:rPr lang="en-US" smtClean="0"/>
-              <a:t>2/7/2018</a:t>
+              <a:t>2/17/2018</a:t>
             </a:fld>
             <a:endParaRPr lang="en-US"/>
           </a:p>
@@ -8007,7 +8096,7 @@
           <a:p>
             <a:fld id="{45696B32-6A70-48EC-8939-9D142D9557CD}" type="datetimeFigureOut">
               <a:rPr lang="en-US" smtClean="0"/>
-              <a:t>2/7/2018</a:t>
+              <a:t>2/17/2018</a:t>
             </a:fld>
             <a:endParaRPr lang="en-US"/>
           </a:p>
@@ -8124,7 +8213,7 @@
           <a:p>
             <a:fld id="{45696B32-6A70-48EC-8939-9D142D9557CD}" type="datetimeFigureOut">
               <a:rPr lang="en-US" smtClean="0"/>
-              <a:t>2/7/2018</a:t>
+              <a:t>2/17/2018</a:t>
             </a:fld>
             <a:endParaRPr lang="en-US"/>
           </a:p>
@@ -8409,7 +8498,7 @@
           <a:p>
             <a:fld id="{699DC775-C286-4358-8C92-D7E584E969B3}" type="datetimeFigureOut">
               <a:rPr lang="en-US" smtClean="0"/>
-              <a:t>2/7/2018</a:t>
+              <a:t>2/17/2018</a:t>
             </a:fld>
             <a:endParaRPr lang="en-US"/>
           </a:p>
@@ -8504,7 +8593,7 @@
           <a:p>
             <a:fld id="{45696B32-6A70-48EC-8939-9D142D9557CD}" type="datetimeFigureOut">
               <a:rPr lang="en-US" smtClean="0"/>
-              <a:t>2/7/2018</a:t>
+              <a:t>2/17/2018</a:t>
             </a:fld>
             <a:endParaRPr lang="en-US"/>
           </a:p>
@@ -8779,7 +8868,7 @@
           <a:p>
             <a:fld id="{45696B32-6A70-48EC-8939-9D142D9557CD}" type="datetimeFigureOut">
               <a:rPr lang="en-US" smtClean="0"/>
-              <a:t>2/7/2018</a:t>
+              <a:t>2/17/2018</a:t>
             </a:fld>
             <a:endParaRPr lang="en-US"/>
           </a:p>
@@ -9031,7 +9120,7 @@
           <a:p>
             <a:fld id="{45696B32-6A70-48EC-8939-9D142D9557CD}" type="datetimeFigureOut">
               <a:rPr lang="en-US" smtClean="0"/>
-              <a:t>2/7/2018</a:t>
+              <a:t>2/17/2018</a:t>
             </a:fld>
             <a:endParaRPr lang="en-US"/>
           </a:p>
@@ -9199,7 +9288,7 @@
           <a:p>
             <a:fld id="{45696B32-6A70-48EC-8939-9D142D9557CD}" type="datetimeFigureOut">
               <a:rPr lang="en-US" smtClean="0"/>
-              <a:t>2/7/2018</a:t>
+              <a:t>2/17/2018</a:t>
             </a:fld>
             <a:endParaRPr lang="en-US"/>
           </a:p>
@@ -9377,7 +9466,7 @@
           <a:p>
             <a:fld id="{45696B32-6A70-48EC-8939-9D142D9557CD}" type="datetimeFigureOut">
               <a:rPr lang="en-US" smtClean="0"/>
-              <a:t>2/7/2018</a:t>
+              <a:t>2/17/2018</a:t>
             </a:fld>
             <a:endParaRPr lang="en-US"/>
           </a:p>
@@ -9796,7 +9885,7 @@
           <a:p>
             <a:fld id="{699DC775-C286-4358-8C92-D7E584E969B3}" type="datetimeFigureOut">
               <a:rPr lang="en-US" smtClean="0"/>
-              <a:t>2/7/2018</a:t>
+              <a:t>2/17/2018</a:t>
             </a:fld>
             <a:endParaRPr lang="en-US"/>
           </a:p>
@@ -9913,7 +10002,7 @@
           <a:p>
             <a:fld id="{699DC775-C286-4358-8C92-D7E584E969B3}" type="datetimeFigureOut">
               <a:rPr lang="en-US" smtClean="0"/>
-              <a:t>2/7/2018</a:t>
+              <a:t>2/17/2018</a:t>
             </a:fld>
             <a:endParaRPr lang="en-US"/>
           </a:p>
@@ -10008,7 +10097,7 @@
           <a:p>
             <a:fld id="{699DC775-C286-4358-8C92-D7E584E969B3}" type="datetimeFigureOut">
               <a:rPr lang="en-US" smtClean="0"/>
-              <a:t>2/7/2018</a:t>
+              <a:t>2/17/2018</a:t>
             </a:fld>
             <a:endParaRPr lang="en-US"/>
           </a:p>
@@ -10283,7 +10372,7 @@
           <a:p>
             <a:fld id="{699DC775-C286-4358-8C92-D7E584E969B3}" type="datetimeFigureOut">
               <a:rPr lang="en-US" smtClean="0"/>
-              <a:t>2/7/2018</a:t>
+              <a:t>2/17/2018</a:t>
             </a:fld>
             <a:endParaRPr lang="en-US"/>
           </a:p>
@@ -10535,7 +10624,7 @@
           <a:p>
             <a:fld id="{699DC775-C286-4358-8C92-D7E584E969B3}" type="datetimeFigureOut">
               <a:rPr lang="en-US" smtClean="0"/>
-              <a:t>2/7/2018</a:t>
+              <a:t>2/17/2018</a:t>
             </a:fld>
             <a:endParaRPr lang="en-US"/>
           </a:p>
@@ -10746,7 +10835,7 @@
           <a:p>
             <a:fld id="{699DC775-C286-4358-8C92-D7E584E969B3}" type="datetimeFigureOut">
               <a:rPr lang="en-US" smtClean="0"/>
-              <a:t>2/7/2018</a:t>
+              <a:t>2/17/2018</a:t>
             </a:fld>
             <a:endParaRPr lang="en-US"/>
           </a:p>
@@ -11259,7 +11348,7 @@
           <a:p>
             <a:fld id="{699DC775-C286-4358-8C92-D7E584E969B3}" type="datetimeFigureOut">
               <a:rPr lang="en-US" smtClean="0"/>
-              <a:t>2/7/2018</a:t>
+              <a:t>2/17/2018</a:t>
             </a:fld>
             <a:endParaRPr lang="en-US"/>
           </a:p>
@@ -11770,7 +11859,7 @@
           <a:p>
             <a:fld id="{699DC775-C286-4358-8C92-D7E584E969B3}" type="datetimeFigureOut">
               <a:rPr lang="en-US" smtClean="0"/>
-              <a:t>2/7/2018</a:t>
+              <a:t>2/17/2018</a:t>
             </a:fld>
             <a:endParaRPr lang="en-US"/>
           </a:p>
@@ -12278,7 +12367,7 @@
           <a:p>
             <a:fld id="{45696B32-6A70-48EC-8939-9D142D9557CD}" type="datetimeFigureOut">
               <a:rPr lang="en-US" smtClean="0"/>
-              <a:t>2/7/2018</a:t>
+              <a:t>2/17/2018</a:t>
             </a:fld>
             <a:endParaRPr lang="en-US"/>
           </a:p>
@@ -13170,6 +13259,12 @@
           <a:prstGeom prst="rect">
             <a:avLst/>
           </a:prstGeom>
+          <a:solidFill>
+            <a:scrgbClr r="0" g="0" b="0">
+              <a:alpha val="0"/>
+            </a:scrgbClr>
+          </a:solidFill>
+          <a:ln/>
         </p:spPr>
       </p:pic>
     </p:spTree>
@@ -13397,6 +13492,150 @@
       </p:pic>
       <p:pic>
         <p:nvPicPr>
+          <p:cNvPr id="11" name="Picture 10"/>
+          <p:cNvPicPr>
+            <a:picLocks noChangeAspect="1"/>
+          </p:cNvPicPr>
+          <p:nvPr/>
+        </p:nvPicPr>
+        <p:blipFill>
+          <a:blip r:embed="rId4">
+            <a:extLst>
+              <a:ext uri="{BEBA8EAE-BF5A-486C-A8C5-ECC9F3942E4B}">
+                <a14:imgProps xmlns:a14="http://schemas.microsoft.com/office/drawing/2010/main">
+                  <a14:imgLayer r:embed="rId5">
+                    <a14:imgEffect>
+                      <a14:artisticPencilGrayscale/>
+                    </a14:imgEffect>
+                  </a14:imgLayer>
+                </a14:imgProps>
+              </a:ext>
+              <a:ext uri="{28A0092B-C50C-407E-A947-70E740481C1C}">
+                <a14:useLocalDpi xmlns:a14="http://schemas.microsoft.com/office/drawing/2010/main" val="0"/>
+              </a:ext>
+            </a:extLst>
+          </a:blip>
+          <a:stretch>
+            <a:fillRect/>
+          </a:stretch>
+        </p:blipFill>
+        <p:spPr>
+          <a:xfrm>
+            <a:off x="1676400" y="914400"/>
+            <a:ext cx="2158171" cy="2213040"/>
+          </a:xfrm>
+          <a:prstGeom prst="rect">
+            <a:avLst/>
+          </a:prstGeom>
+        </p:spPr>
+      </p:pic>
+      <p:pic>
+        <p:nvPicPr>
+          <p:cNvPr id="3" name="Picture 2">
+            <a:extLst>
+              <a:ext uri="{FF2B5EF4-FFF2-40B4-BE49-F238E27FC236}">
+                <a16:creationId xmlns:a16="http://schemas.microsoft.com/office/drawing/2014/main" id="{49035B3A-B2AF-4ADC-AF11-DA5604243147}"/>
+              </a:ext>
+            </a:extLst>
+          </p:cNvPr>
+          <p:cNvPicPr>
+            <a:picLocks noChangeAspect="1"/>
+          </p:cNvPicPr>
+          <p:nvPr/>
+        </p:nvPicPr>
+        <p:blipFill>
+          <a:blip r:embed="rId6">
+            <a:extLst>
+              <a:ext uri="{BEBA8EAE-BF5A-486C-A8C5-ECC9F3942E4B}">
+                <a14:imgProps xmlns:a14="http://schemas.microsoft.com/office/drawing/2010/main">
+                  <a14:imgLayer r:embed="rId7">
+                    <a14:imgEffect>
+                      <a14:artisticPlasticWrap/>
+                    </a14:imgEffect>
+                  </a14:imgLayer>
+                </a14:imgProps>
+              </a:ext>
+              <a:ext uri="{28A0092B-C50C-407E-A947-70E740481C1C}">
+                <a14:useLocalDpi xmlns:a14="http://schemas.microsoft.com/office/drawing/2010/main" val="0"/>
+              </a:ext>
+            </a:extLst>
+          </a:blip>
+          <a:stretch>
+            <a:fillRect/>
+          </a:stretch>
+        </p:blipFill>
+        <p:spPr>
+          <a:xfrm>
+            <a:off x="6096000" y="1920010"/>
+            <a:ext cx="2261812" cy="3273836"/>
+          </a:xfrm>
+          <a:prstGeom prst="rect">
+            <a:avLst/>
+          </a:prstGeom>
+        </p:spPr>
+      </p:pic>
+    </p:spTree>
+    <p:extLst>
+      <p:ext uri="{BB962C8B-B14F-4D97-AF65-F5344CB8AC3E}">
+        <p14:creationId xmlns:p14="http://schemas.microsoft.com/office/powerpoint/2010/main" val="414522222"/>
+      </p:ext>
+    </p:extLst>
+  </p:cSld>
+  <p:clrMapOvr>
+    <a:masterClrMapping/>
+  </p:clrMapOvr>
+</p:sld>
+</file>
+
+<file path=ppt/slides/slide7.xml><?xml version="1.0" encoding="utf-8"?>
+<p:sld xmlns:a="http://schemas.openxmlformats.org/drawingml/2006/main" xmlns:r="http://schemas.openxmlformats.org/officeDocument/2006/relationships" xmlns:p="http://schemas.openxmlformats.org/presentationml/2006/main">
+  <p:cSld>
+    <p:spTree>
+      <p:nvGrpSpPr>
+        <p:cNvPr id="1" name=""/>
+        <p:cNvGrpSpPr/>
+        <p:nvPr/>
+      </p:nvGrpSpPr>
+      <p:grpSpPr>
+        <a:xfrm>
+          <a:off x="0" y="0"/>
+          <a:ext cx="0" cy="0"/>
+          <a:chOff x="0" y="0"/>
+          <a:chExt cx="0" cy="0"/>
+        </a:xfrm>
+      </p:grpSpPr>
+      <p:pic>
+        <p:nvPicPr>
+          <p:cNvPr id="10" name="Picture 9"/>
+          <p:cNvPicPr>
+            <a:picLocks noChangeAspect="1"/>
+          </p:cNvPicPr>
+          <p:nvPr/>
+        </p:nvPicPr>
+        <p:blipFill>
+          <a:blip r:embed="rId3">
+            <a:extLst>
+              <a:ext uri="{28A0092B-C50C-407E-A947-70E740481C1C}">
+                <a14:useLocalDpi xmlns:a14="http://schemas.microsoft.com/office/drawing/2010/main" val="0"/>
+              </a:ext>
+            </a:extLst>
+          </a:blip>
+          <a:stretch>
+            <a:fillRect/>
+          </a:stretch>
+        </p:blipFill>
+        <p:spPr>
+          <a:xfrm>
+            <a:off x="1447800" y="4572000"/>
+            <a:ext cx="1853345" cy="1243692"/>
+          </a:xfrm>
+          <a:prstGeom prst="rect">
+            <a:avLst/>
+          </a:prstGeom>
+        </p:spPr>
+      </p:pic>
+      <p:pic>
+        <p:nvPicPr>
           <p:cNvPr id="5" name="Picture 10">
             <a:extLst>
               <a:ext uri="{FF2B5EF4-FFF2-40B4-BE49-F238E27FC236}">
@@ -13416,7 +13655,7 @@
                 <a14:imgProps xmlns:a14="http://schemas.microsoft.com/office/drawing/2010/main">
                   <a14:imgLayer r:embed="rId5">
                     <a14:imgEffect>
-                      <a14:artisticLightScreen/>
+                      <a14:artisticPlasticWrap/>
                     </a14:imgEffect>
                   </a14:imgLayer>
                 </a14:imgProps>
@@ -13461,7 +13700,7 @@
                 <a14:imgProps xmlns:a14="http://schemas.microsoft.com/office/drawing/2010/main">
                   <a14:imgLayer r:embed="rId7">
                     <a14:imgEffect>
-                      <a14:artisticLightScreen/>
+                      <a14:artisticPlasticWrap/>
                     </a14:imgEffect>
                   </a14:imgLayer>
                 </a14:imgProps>

</xml_diff>

<commit_message>
Revert: Accidental edit to SyncLab_VisualEffects.pptx
</commit_message>
<xml_diff>
--- a/doc/test/SyncLab/SyncLab_VisualEffects.pptx
+++ b/doc/test/SyncLab/SyncLab_VisualEffects.pptx
@@ -229,7 +229,7 @@
           <a:p>
             <a:fld id="{43E32005-3A63-48D2-8C73-BF5F95786EBD}" type="datetimeFigureOut">
               <a:rPr lang="en-US" smtClean="0"/>
-              <a:t>4/10/2018</a:t>
+              <a:t>2/17/2018</a:t>
             </a:fld>
             <a:endParaRPr lang="en-US"/>
           </a:p>
@@ -1023,7 +1023,7 @@
           <a:p>
             <a:fld id="{699DC775-C286-4358-8C92-D7E584E969B3}" type="datetimeFigureOut">
               <a:rPr lang="en-US" smtClean="0"/>
-              <a:t>4/10/2018</a:t>
+              <a:t>2/17/2018</a:t>
             </a:fld>
             <a:endParaRPr lang="en-US"/>
           </a:p>
@@ -1191,7 +1191,7 @@
           <a:p>
             <a:fld id="{699DC775-C286-4358-8C92-D7E584E969B3}" type="datetimeFigureOut">
               <a:rPr lang="en-US" smtClean="0"/>
-              <a:t>4/10/2018</a:t>
+              <a:t>2/17/2018</a:t>
             </a:fld>
             <a:endParaRPr lang="en-US"/>
           </a:p>
@@ -1369,7 +1369,7 @@
           <a:p>
             <a:fld id="{699DC775-C286-4358-8C92-D7E584E969B3}" type="datetimeFigureOut">
               <a:rPr lang="en-US" smtClean="0"/>
-              <a:t>4/10/2018</a:t>
+              <a:t>2/17/2018</a:t>
             </a:fld>
             <a:endParaRPr lang="en-US"/>
           </a:p>
@@ -1609,7 +1609,7 @@
           <a:p>
             <a:fld id="{699DC775-C286-4358-8C92-D7E584E969B3}" type="datetimeFigureOut">
               <a:rPr lang="en-US" smtClean="0"/>
-              <a:t>4/10/2018</a:t>
+              <a:t>2/17/2018</a:t>
             </a:fld>
             <a:endParaRPr lang="en-US"/>
           </a:p>
@@ -1777,7 +1777,7 @@
           <a:p>
             <a:fld id="{699DC775-C286-4358-8C92-D7E584E969B3}" type="datetimeFigureOut">
               <a:rPr lang="en-US" smtClean="0"/>
-              <a:t>4/10/2018</a:t>
+              <a:t>2/17/2018</a:t>
             </a:fld>
             <a:endParaRPr lang="en-US"/>
           </a:p>
@@ -2022,7 +2022,7 @@
           <a:p>
             <a:fld id="{699DC775-C286-4358-8C92-D7E584E969B3}" type="datetimeFigureOut">
               <a:rPr lang="en-US" smtClean="0"/>
-              <a:t>4/10/2018</a:t>
+              <a:t>2/17/2018</a:t>
             </a:fld>
             <a:endParaRPr lang="en-US"/>
           </a:p>
@@ -2307,7 +2307,7 @@
           <a:p>
             <a:fld id="{699DC775-C286-4358-8C92-D7E584E969B3}" type="datetimeFigureOut">
               <a:rPr lang="en-US" smtClean="0"/>
-              <a:t>4/10/2018</a:t>
+              <a:t>2/17/2018</a:t>
             </a:fld>
             <a:endParaRPr lang="en-US"/>
           </a:p>
@@ -2726,7 +2726,7 @@
           <a:p>
             <a:fld id="{699DC775-C286-4358-8C92-D7E584E969B3}" type="datetimeFigureOut">
               <a:rPr lang="en-US" smtClean="0"/>
-              <a:t>4/10/2018</a:t>
+              <a:t>2/17/2018</a:t>
             </a:fld>
             <a:endParaRPr lang="en-US"/>
           </a:p>
@@ -2843,7 +2843,7 @@
           <a:p>
             <a:fld id="{699DC775-C286-4358-8C92-D7E584E969B3}" type="datetimeFigureOut">
               <a:rPr lang="en-US" smtClean="0"/>
-              <a:t>4/10/2018</a:t>
+              <a:t>2/17/2018</a:t>
             </a:fld>
             <a:endParaRPr lang="en-US"/>
           </a:p>
@@ -2938,7 +2938,7 @@
           <a:p>
             <a:fld id="{699DC775-C286-4358-8C92-D7E584E969B3}" type="datetimeFigureOut">
               <a:rPr lang="en-US" smtClean="0"/>
-              <a:t>4/10/2018</a:t>
+              <a:t>2/17/2018</a:t>
             </a:fld>
             <a:endParaRPr lang="en-US"/>
           </a:p>
@@ -3213,7 +3213,7 @@
           <a:p>
             <a:fld id="{699DC775-C286-4358-8C92-D7E584E969B3}" type="datetimeFigureOut">
               <a:rPr lang="en-US" smtClean="0"/>
-              <a:t>4/10/2018</a:t>
+              <a:t>2/17/2018</a:t>
             </a:fld>
             <a:endParaRPr lang="en-US"/>
           </a:p>
@@ -3381,7 +3381,7 @@
           <a:p>
             <a:fld id="{699DC775-C286-4358-8C92-D7E584E969B3}" type="datetimeFigureOut">
               <a:rPr lang="en-US" smtClean="0"/>
-              <a:t>4/10/2018</a:t>
+              <a:t>2/17/2018</a:t>
             </a:fld>
             <a:endParaRPr lang="en-US"/>
           </a:p>
@@ -3633,7 +3633,7 @@
           <a:p>
             <a:fld id="{699DC775-C286-4358-8C92-D7E584E969B3}" type="datetimeFigureOut">
               <a:rPr lang="en-US" smtClean="0"/>
-              <a:t>4/10/2018</a:t>
+              <a:t>2/17/2018</a:t>
             </a:fld>
             <a:endParaRPr lang="en-US"/>
           </a:p>
@@ -3801,7 +3801,7 @@
           <a:p>
             <a:fld id="{699DC775-C286-4358-8C92-D7E584E969B3}" type="datetimeFigureOut">
               <a:rPr lang="en-US" smtClean="0"/>
-              <a:t>4/10/2018</a:t>
+              <a:t>2/17/2018</a:t>
             </a:fld>
             <a:endParaRPr lang="en-US"/>
           </a:p>
@@ -3979,7 +3979,7 @@
           <a:p>
             <a:fld id="{699DC775-C286-4358-8C92-D7E584E969B3}" type="datetimeFigureOut">
               <a:rPr lang="en-US" smtClean="0"/>
-              <a:t>4/10/2018</a:t>
+              <a:t>2/17/2018</a:t>
             </a:fld>
             <a:endParaRPr lang="en-US"/>
           </a:p>
@@ -4227,7 +4227,7 @@
           <a:p>
             <a:fld id="{699DC775-C286-4358-8C92-D7E584E969B3}" type="datetimeFigureOut">
               <a:rPr lang="en-US" smtClean="0"/>
-              <a:t>4/10/2018</a:t>
+              <a:t>2/17/2018</a:t>
             </a:fld>
             <a:endParaRPr lang="en-US"/>
           </a:p>
@@ -4403,7 +4403,7 @@
           <a:p>
             <a:fld id="{699DC775-C286-4358-8C92-D7E584E969B3}" type="datetimeFigureOut">
               <a:rPr lang="en-US" smtClean="0"/>
-              <a:t>4/10/2018</a:t>
+              <a:t>2/17/2018</a:t>
             </a:fld>
             <a:endParaRPr lang="en-US"/>
           </a:p>
@@ -4656,7 +4656,7 @@
           <a:p>
             <a:fld id="{699DC775-C286-4358-8C92-D7E584E969B3}" type="datetimeFigureOut">
               <a:rPr lang="en-US" smtClean="0"/>
-              <a:t>4/10/2018</a:t>
+              <a:t>2/17/2018</a:t>
             </a:fld>
             <a:endParaRPr lang="en-US"/>
           </a:p>
@@ -4949,7 +4949,7 @@
           <a:p>
             <a:fld id="{699DC775-C286-4358-8C92-D7E584E969B3}" type="datetimeFigureOut">
               <a:rPr lang="en-US" smtClean="0"/>
-              <a:t>4/10/2018</a:t>
+              <a:t>2/17/2018</a:t>
             </a:fld>
             <a:endParaRPr lang="en-US"/>
           </a:p>
@@ -5376,7 +5376,7 @@
           <a:p>
             <a:fld id="{699DC775-C286-4358-8C92-D7E584E969B3}" type="datetimeFigureOut">
               <a:rPr lang="en-US" smtClean="0"/>
-              <a:t>4/10/2018</a:t>
+              <a:t>2/17/2018</a:t>
             </a:fld>
             <a:endParaRPr lang="en-US"/>
           </a:p>
@@ -5501,7 +5501,7 @@
           <a:p>
             <a:fld id="{699DC775-C286-4358-8C92-D7E584E969B3}" type="datetimeFigureOut">
               <a:rPr lang="en-US" smtClean="0"/>
-              <a:t>4/10/2018</a:t>
+              <a:t>2/17/2018</a:t>
             </a:fld>
             <a:endParaRPr lang="en-US"/>
           </a:p>
@@ -5604,7 +5604,7 @@
           <a:p>
             <a:fld id="{699DC775-C286-4358-8C92-D7E584E969B3}" type="datetimeFigureOut">
               <a:rPr lang="en-US" smtClean="0"/>
-              <a:t>4/10/2018</a:t>
+              <a:t>2/17/2018</a:t>
             </a:fld>
             <a:endParaRPr lang="en-US"/>
           </a:p>
@@ -5849,7 +5849,7 @@
           <a:p>
             <a:fld id="{699DC775-C286-4358-8C92-D7E584E969B3}" type="datetimeFigureOut">
               <a:rPr lang="en-US" smtClean="0"/>
-              <a:t>4/10/2018</a:t>
+              <a:t>2/17/2018</a:t>
             </a:fld>
             <a:endParaRPr lang="en-US"/>
           </a:p>
@@ -6132,7 +6132,7 @@
           <a:p>
             <a:fld id="{699DC775-C286-4358-8C92-D7E584E969B3}" type="datetimeFigureOut">
               <a:rPr lang="en-US" smtClean="0"/>
-              <a:t>4/10/2018</a:t>
+              <a:t>2/17/2018</a:t>
             </a:fld>
             <a:endParaRPr lang="en-US"/>
           </a:p>
@@ -6392,7 +6392,7 @@
           <a:p>
             <a:fld id="{699DC775-C286-4358-8C92-D7E584E969B3}" type="datetimeFigureOut">
               <a:rPr lang="en-US" smtClean="0"/>
-              <a:t>4/10/2018</a:t>
+              <a:t>2/17/2018</a:t>
             </a:fld>
             <a:endParaRPr lang="en-US"/>
           </a:p>
@@ -6568,7 +6568,7 @@
           <a:p>
             <a:fld id="{699DC775-C286-4358-8C92-D7E584E969B3}" type="datetimeFigureOut">
               <a:rPr lang="en-US" smtClean="0"/>
-              <a:t>4/10/2018</a:t>
+              <a:t>2/17/2018</a:t>
             </a:fld>
             <a:endParaRPr lang="en-US"/>
           </a:p>
@@ -6754,7 +6754,7 @@
           <a:p>
             <a:fld id="{699DC775-C286-4358-8C92-D7E584E969B3}" type="datetimeFigureOut">
               <a:rPr lang="en-US" smtClean="0"/>
-              <a:t>4/10/2018</a:t>
+              <a:t>2/17/2018</a:t>
             </a:fld>
             <a:endParaRPr lang="en-US"/>
           </a:p>
@@ -6944,7 +6944,7 @@
           <a:p>
             <a:fld id="{45696B32-6A70-48EC-8939-9D142D9557CD}" type="datetimeFigureOut">
               <a:rPr lang="en-US" smtClean="0"/>
-              <a:t>4/10/2018</a:t>
+              <a:t>2/17/2018</a:t>
             </a:fld>
             <a:endParaRPr lang="en-US"/>
           </a:p>
@@ -7258,7 +7258,7 @@
           <a:p>
             <a:fld id="{45696B32-6A70-48EC-8939-9D142D9557CD}" type="datetimeFigureOut">
               <a:rPr lang="en-US" smtClean="0"/>
-              <a:t>4/10/2018</a:t>
+              <a:t>2/17/2018</a:t>
             </a:fld>
             <a:endParaRPr lang="en-US"/>
           </a:p>
@@ -7503,7 +7503,7 @@
           <a:p>
             <a:fld id="{45696B32-6A70-48EC-8939-9D142D9557CD}" type="datetimeFigureOut">
               <a:rPr lang="en-US" smtClean="0"/>
-              <a:t>4/10/2018</a:t>
+              <a:t>2/17/2018</a:t>
             </a:fld>
             <a:endParaRPr lang="en-US"/>
           </a:p>
@@ -7732,7 +7732,7 @@
           <a:p>
             <a:fld id="{45696B32-6A70-48EC-8939-9D142D9557CD}" type="datetimeFigureOut">
               <a:rPr lang="en-US" smtClean="0"/>
-              <a:t>4/10/2018</a:t>
+              <a:t>2/17/2018</a:t>
             </a:fld>
             <a:endParaRPr lang="en-US"/>
           </a:p>
@@ -8096,7 +8096,7 @@
           <a:p>
             <a:fld id="{45696B32-6A70-48EC-8939-9D142D9557CD}" type="datetimeFigureOut">
               <a:rPr lang="en-US" smtClean="0"/>
-              <a:t>4/10/2018</a:t>
+              <a:t>2/17/2018</a:t>
             </a:fld>
             <a:endParaRPr lang="en-US"/>
           </a:p>
@@ -8213,7 +8213,7 @@
           <a:p>
             <a:fld id="{45696B32-6A70-48EC-8939-9D142D9557CD}" type="datetimeFigureOut">
               <a:rPr lang="en-US" smtClean="0"/>
-              <a:t>4/10/2018</a:t>
+              <a:t>2/17/2018</a:t>
             </a:fld>
             <a:endParaRPr lang="en-US"/>
           </a:p>
@@ -8498,7 +8498,7 @@
           <a:p>
             <a:fld id="{699DC775-C286-4358-8C92-D7E584E969B3}" type="datetimeFigureOut">
               <a:rPr lang="en-US" smtClean="0"/>
-              <a:t>4/10/2018</a:t>
+              <a:t>2/17/2018</a:t>
             </a:fld>
             <a:endParaRPr lang="en-US"/>
           </a:p>
@@ -8593,7 +8593,7 @@
           <a:p>
             <a:fld id="{45696B32-6A70-48EC-8939-9D142D9557CD}" type="datetimeFigureOut">
               <a:rPr lang="en-US" smtClean="0"/>
-              <a:t>4/10/2018</a:t>
+              <a:t>2/17/2018</a:t>
             </a:fld>
             <a:endParaRPr lang="en-US"/>
           </a:p>
@@ -8868,7 +8868,7 @@
           <a:p>
             <a:fld id="{45696B32-6A70-48EC-8939-9D142D9557CD}" type="datetimeFigureOut">
               <a:rPr lang="en-US" smtClean="0"/>
-              <a:t>4/10/2018</a:t>
+              <a:t>2/17/2018</a:t>
             </a:fld>
             <a:endParaRPr lang="en-US"/>
           </a:p>
@@ -9120,7 +9120,7 @@
           <a:p>
             <a:fld id="{45696B32-6A70-48EC-8939-9D142D9557CD}" type="datetimeFigureOut">
               <a:rPr lang="en-US" smtClean="0"/>
-              <a:t>4/10/2018</a:t>
+              <a:t>2/17/2018</a:t>
             </a:fld>
             <a:endParaRPr lang="en-US"/>
           </a:p>
@@ -9288,7 +9288,7 @@
           <a:p>
             <a:fld id="{45696B32-6A70-48EC-8939-9D142D9557CD}" type="datetimeFigureOut">
               <a:rPr lang="en-US" smtClean="0"/>
-              <a:t>4/10/2018</a:t>
+              <a:t>2/17/2018</a:t>
             </a:fld>
             <a:endParaRPr lang="en-US"/>
           </a:p>
@@ -9466,7 +9466,7 @@
           <a:p>
             <a:fld id="{45696B32-6A70-48EC-8939-9D142D9557CD}" type="datetimeFigureOut">
               <a:rPr lang="en-US" smtClean="0"/>
-              <a:t>4/10/2018</a:t>
+              <a:t>2/17/2018</a:t>
             </a:fld>
             <a:endParaRPr lang="en-US"/>
           </a:p>
@@ -9885,7 +9885,7 @@
           <a:p>
             <a:fld id="{699DC775-C286-4358-8C92-D7E584E969B3}" type="datetimeFigureOut">
               <a:rPr lang="en-US" smtClean="0"/>
-              <a:t>4/10/2018</a:t>
+              <a:t>2/17/2018</a:t>
             </a:fld>
             <a:endParaRPr lang="en-US"/>
           </a:p>
@@ -10002,7 +10002,7 @@
           <a:p>
             <a:fld id="{699DC775-C286-4358-8C92-D7E584E969B3}" type="datetimeFigureOut">
               <a:rPr lang="en-US" smtClean="0"/>
-              <a:t>4/10/2018</a:t>
+              <a:t>2/17/2018</a:t>
             </a:fld>
             <a:endParaRPr lang="en-US"/>
           </a:p>
@@ -10097,7 +10097,7 @@
           <a:p>
             <a:fld id="{699DC775-C286-4358-8C92-D7E584E969B3}" type="datetimeFigureOut">
               <a:rPr lang="en-US" smtClean="0"/>
-              <a:t>4/10/2018</a:t>
+              <a:t>2/17/2018</a:t>
             </a:fld>
             <a:endParaRPr lang="en-US"/>
           </a:p>
@@ -10372,7 +10372,7 @@
           <a:p>
             <a:fld id="{699DC775-C286-4358-8C92-D7E584E969B3}" type="datetimeFigureOut">
               <a:rPr lang="en-US" smtClean="0"/>
-              <a:t>4/10/2018</a:t>
+              <a:t>2/17/2018</a:t>
             </a:fld>
             <a:endParaRPr lang="en-US"/>
           </a:p>
@@ -10624,7 +10624,7 @@
           <a:p>
             <a:fld id="{699DC775-C286-4358-8C92-D7E584E969B3}" type="datetimeFigureOut">
               <a:rPr lang="en-US" smtClean="0"/>
-              <a:t>4/10/2018</a:t>
+              <a:t>2/17/2018</a:t>
             </a:fld>
             <a:endParaRPr lang="en-US"/>
           </a:p>
@@ -10835,7 +10835,7 @@
           <a:p>
             <a:fld id="{699DC775-C286-4358-8C92-D7E584E969B3}" type="datetimeFigureOut">
               <a:rPr lang="en-US" smtClean="0"/>
-              <a:t>4/10/2018</a:t>
+              <a:t>2/17/2018</a:t>
             </a:fld>
             <a:endParaRPr lang="en-US"/>
           </a:p>
@@ -11348,7 +11348,7 @@
           <a:p>
             <a:fld id="{699DC775-C286-4358-8C92-D7E584E969B3}" type="datetimeFigureOut">
               <a:rPr lang="en-US" smtClean="0"/>
-              <a:t>4/10/2018</a:t>
+              <a:t>2/17/2018</a:t>
             </a:fld>
             <a:endParaRPr lang="en-US"/>
           </a:p>
@@ -11859,7 +11859,7 @@
           <a:p>
             <a:fld id="{699DC775-C286-4358-8C92-D7E584E969B3}" type="datetimeFigureOut">
               <a:rPr lang="en-US" smtClean="0"/>
-              <a:t>4/10/2018</a:t>
+              <a:t>2/17/2018</a:t>
             </a:fld>
             <a:endParaRPr lang="en-US"/>
           </a:p>
@@ -12367,7 +12367,7 @@
           <a:p>
             <a:fld id="{45696B32-6A70-48EC-8939-9D142D9557CD}" type="datetimeFigureOut">
               <a:rPr lang="en-US" smtClean="0"/>
-              <a:t>4/10/2018</a:t>
+              <a:t>2/17/2018</a:t>
             </a:fld>
             <a:endParaRPr lang="en-US"/>
           </a:p>

</xml_diff>